<commit_message>
Updating hands-on with more information about methods.
</commit_message>
<xml_diff>
--- a/DAY1/01 - Introduction to Learning/Introduction to Learning.pptx
+++ b/DAY1/01 - Introduction to Learning/Introduction to Learning.pptx
@@ -5,11 +5,11 @@
     <p:sldMasterId id="2147483663" r:id="rId1"/>
   </p:sldMasterIdLst>
   <p:notesMasterIdLst>
-    <p:notesMasterId r:id="rId12"/>
+    <p:notesMasterId r:id="rId14"/>
   </p:notesMasterIdLst>
   <p:sldIdLst>
     <p:sldId id="256" r:id="rId2"/>
-    <p:sldId id="347" r:id="rId3"/>
+    <p:sldId id="352" r:id="rId3"/>
     <p:sldId id="348" r:id="rId4"/>
     <p:sldId id="349" r:id="rId5"/>
     <p:sldId id="350" r:id="rId6"/>
@@ -18,20 +18,22 @@
     <p:sldId id="303" r:id="rId9"/>
     <p:sldId id="320" r:id="rId10"/>
     <p:sldId id="351" r:id="rId11"/>
+    <p:sldId id="353" r:id="rId12"/>
+    <p:sldId id="354" r:id="rId13"/>
   </p:sldIdLst>
   <p:sldSz cx="9144000" cy="5143500" type="screen16x9"/>
   <p:notesSz cx="6858000" cy="9144000"/>
   <p:embeddedFontLst>
     <p:embeddedFont>
       <p:font typeface="Arial Narrow" panose="020B0604020202020204" pitchFamily="34" charset="0"/>
-      <p:regular r:id="rId13"/>
-      <p:bold r:id="rId14"/>
-      <p:italic r:id="rId15"/>
-      <p:boldItalic r:id="rId16"/>
+      <p:regular r:id="rId15"/>
+      <p:bold r:id="rId16"/>
+      <p:italic r:id="rId17"/>
+      <p:boldItalic r:id="rId18"/>
     </p:embeddedFont>
     <p:embeddedFont>
       <p:font typeface="Cambria Math" panose="02040503050406030204" pitchFamily="18" charset="0"/>
-      <p:regular r:id="rId17"/>
+      <p:regular r:id="rId19"/>
     </p:embeddedFont>
   </p:embeddedFontLst>
   <p:defaultTextStyle>
@@ -841,7 +843,7 @@
           <a:lstStyle/>
           <a:p>
             <a:fld id="{383FCE59-ED68-1145-BEA5-66C22E95295E}" type="datetimeFigureOut">
-              <a:t>11.01.2024</a:t>
+              <a:t>14.01.2024</a:t>
             </a:fld>
             <a:endParaRPr lang="en-CH"/>
           </a:p>
@@ -1050,7 +1052,7 @@
           <a:lstStyle/>
           <a:p>
             <a:fld id="{383FCE59-ED68-1145-BEA5-66C22E95295E}" type="datetimeFigureOut">
-              <a:t>11.01.2024</a:t>
+              <a:t>14.01.2024</a:t>
             </a:fld>
             <a:endParaRPr lang="en-CH"/>
           </a:p>
@@ -1269,7 +1271,7 @@
           <a:lstStyle/>
           <a:p>
             <a:fld id="{383FCE59-ED68-1145-BEA5-66C22E95295E}" type="datetimeFigureOut">
-              <a:t>11.01.2024</a:t>
+              <a:t>14.01.2024</a:t>
             </a:fld>
             <a:endParaRPr lang="en-CH"/>
           </a:p>
@@ -1478,7 +1480,7 @@
           <a:lstStyle/>
           <a:p>
             <a:fld id="{383FCE59-ED68-1145-BEA5-66C22E95295E}" type="datetimeFigureOut">
-              <a:t>11.01.2024</a:t>
+              <a:t>14.01.2024</a:t>
             </a:fld>
             <a:endParaRPr lang="en-CH"/>
           </a:p>
@@ -1763,7 +1765,7 @@
           <a:lstStyle/>
           <a:p>
             <a:fld id="{383FCE59-ED68-1145-BEA5-66C22E95295E}" type="datetimeFigureOut">
-              <a:t>11.01.2024</a:t>
+              <a:t>14.01.2024</a:t>
             </a:fld>
             <a:endParaRPr lang="en-CH"/>
           </a:p>
@@ -2040,7 +2042,7 @@
           <a:lstStyle/>
           <a:p>
             <a:fld id="{383FCE59-ED68-1145-BEA5-66C22E95295E}" type="datetimeFigureOut">
-              <a:t>11.01.2024</a:t>
+              <a:t>14.01.2024</a:t>
             </a:fld>
             <a:endParaRPr lang="en-CH"/>
           </a:p>
@@ -2464,7 +2466,7 @@
           <a:lstStyle/>
           <a:p>
             <a:fld id="{383FCE59-ED68-1145-BEA5-66C22E95295E}" type="datetimeFigureOut">
-              <a:t>11.01.2024</a:t>
+              <a:t>14.01.2024</a:t>
             </a:fld>
             <a:endParaRPr lang="en-CH"/>
           </a:p>
@@ -2615,7 +2617,7 @@
           <a:lstStyle/>
           <a:p>
             <a:fld id="{383FCE59-ED68-1145-BEA5-66C22E95295E}" type="datetimeFigureOut">
-              <a:t>11.01.2024</a:t>
+              <a:t>14.01.2024</a:t>
             </a:fld>
             <a:endParaRPr lang="en-CH"/>
           </a:p>
@@ -2737,7 +2739,7 @@
           <a:lstStyle/>
           <a:p>
             <a:fld id="{383FCE59-ED68-1145-BEA5-66C22E95295E}" type="datetimeFigureOut">
-              <a:t>11.01.2024</a:t>
+              <a:t>14.01.2024</a:t>
             </a:fld>
             <a:endParaRPr lang="en-CH"/>
           </a:p>
@@ -3059,7 +3061,7 @@
           <a:lstStyle/>
           <a:p>
             <a:fld id="{383FCE59-ED68-1145-BEA5-66C22E95295E}" type="datetimeFigureOut">
-              <a:t>11.01.2024</a:t>
+              <a:t>14.01.2024</a:t>
             </a:fld>
             <a:endParaRPr lang="en-CH"/>
           </a:p>
@@ -3357,7 +3359,7 @@
           <a:lstStyle/>
           <a:p>
             <a:fld id="{383FCE59-ED68-1145-BEA5-66C22E95295E}" type="datetimeFigureOut">
-              <a:t>11.01.2024</a:t>
+              <a:t>14.01.2024</a:t>
             </a:fld>
             <a:endParaRPr lang="en-CH"/>
           </a:p>
@@ -3612,7 +3614,7 @@
             <a:fld id="{383FCE59-ED68-1145-BEA5-66C22E95295E}" type="datetimeFigureOut">
               <a:rPr lang="en-CH"/>
               <a:pPr/>
-              <a:t>11.01.2024</a:t>
+              <a:t>14.01.2024</a:t>
             </a:fld>
             <a:endParaRPr lang="en-CH"/>
           </a:p>
@@ -4205,6 +4207,231 @@
 </p:sld>
 </file>
 
+<file path=ppt/slides/slide11.xml><?xml version="1.0" encoding="utf-8"?>
+<p:sld xmlns:a="http://schemas.openxmlformats.org/drawingml/2006/main" xmlns:r="http://schemas.openxmlformats.org/officeDocument/2006/relationships" xmlns:p="http://schemas.openxmlformats.org/presentationml/2006/main">
+  <p:cSld>
+    <p:spTree>
+      <p:nvGrpSpPr>
+        <p:cNvPr id="1" name=""/>
+        <p:cNvGrpSpPr/>
+        <p:nvPr/>
+      </p:nvGrpSpPr>
+      <p:grpSpPr>
+        <a:xfrm>
+          <a:off x="0" y="0"/>
+          <a:ext cx="0" cy="0"/>
+          <a:chOff x="0" y="0"/>
+          <a:chExt cx="0" cy="0"/>
+        </a:xfrm>
+      </p:grpSpPr>
+      <p:sp>
+        <p:nvSpPr>
+          <p:cNvPr id="2" name="Title 1">
+            <a:extLst>
+              <a:ext uri="{FF2B5EF4-FFF2-40B4-BE49-F238E27FC236}">
+                <a16:creationId xmlns:a16="http://schemas.microsoft.com/office/drawing/2014/main" id="{D0599F26-FA18-9293-FC2E-38C41BF805C0}"/>
+              </a:ext>
+            </a:extLst>
+          </p:cNvPr>
+          <p:cNvSpPr>
+            <a:spLocks noGrp="1"/>
+          </p:cNvSpPr>
+          <p:nvPr>
+            <p:ph type="title"/>
+          </p:nvPr>
+        </p:nvSpPr>
+        <p:spPr/>
+        <p:txBody>
+          <a:bodyPr/>
+          <a:lstStyle/>
+          <a:p>
+            <a:r>
+              <a:rPr lang="en-CH" dirty="0"/>
+              <a:t>Optimisation </a:t>
+            </a:r>
+            <a:r>
+              <a:rPr lang="en-GB" dirty="0"/>
+              <a:t>in Mathematics</a:t>
+            </a:r>
+            <a:endParaRPr lang="en-CH" dirty="0"/>
+          </a:p>
+        </p:txBody>
+      </p:sp>
+      <p:sp>
+        <p:nvSpPr>
+          <p:cNvPr id="3" name="Content Placeholder 2">
+            <a:extLst>
+              <a:ext uri="{FF2B5EF4-FFF2-40B4-BE49-F238E27FC236}">
+                <a16:creationId xmlns:a16="http://schemas.microsoft.com/office/drawing/2014/main" id="{7533B656-C348-405F-C9FA-423E2118AC8E}"/>
+              </a:ext>
+            </a:extLst>
+          </p:cNvPr>
+          <p:cNvSpPr>
+            <a:spLocks noGrp="1"/>
+          </p:cNvSpPr>
+          <p:nvPr>
+            <p:ph idx="1"/>
+          </p:nvPr>
+        </p:nvSpPr>
+        <p:spPr/>
+        <p:txBody>
+          <a:bodyPr>
+            <a:normAutofit/>
+          </a:bodyPr>
+          <a:lstStyle/>
+          <a:p>
+            <a:pPr marL="0" indent="0">
+              <a:buNone/>
+            </a:pPr>
+            <a:endParaRPr lang="en-GB" sz="2400" dirty="0"/>
+          </a:p>
+          <a:p>
+            <a:pPr marL="0" indent="0">
+              <a:buNone/>
+            </a:pPr>
+            <a:r>
+              <a:rPr lang="en-GB" sz="2400" dirty="0"/>
+              <a:t>Optimization involves finding the maximum or minimum value of a function within its domain. It often deals with determining the best allocation of resources under given constraints. Examples include minimizing cost, maximizing efficiency, or finding the best fit of a model to data.</a:t>
+            </a:r>
+            <a:endParaRPr lang="en-CH" sz="2400" dirty="0"/>
+          </a:p>
+        </p:txBody>
+      </p:sp>
+    </p:spTree>
+    <p:extLst>
+      <p:ext uri="{BB962C8B-B14F-4D97-AF65-F5344CB8AC3E}">
+        <p14:creationId xmlns:p14="http://schemas.microsoft.com/office/powerpoint/2010/main" val="2296896808"/>
+      </p:ext>
+    </p:extLst>
+  </p:cSld>
+  <p:clrMapOvr>
+    <a:masterClrMapping/>
+  </p:clrMapOvr>
+</p:sld>
+</file>
+
+<file path=ppt/slides/slide12.xml><?xml version="1.0" encoding="utf-8"?>
+<p:sld xmlns:a="http://schemas.openxmlformats.org/drawingml/2006/main" xmlns:r="http://schemas.openxmlformats.org/officeDocument/2006/relationships" xmlns:p="http://schemas.openxmlformats.org/presentationml/2006/main">
+  <p:cSld>
+    <p:spTree>
+      <p:nvGrpSpPr>
+        <p:cNvPr id="1" name=""/>
+        <p:cNvGrpSpPr/>
+        <p:nvPr/>
+      </p:nvGrpSpPr>
+      <p:grpSpPr>
+        <a:xfrm>
+          <a:off x="0" y="0"/>
+          <a:ext cx="0" cy="0"/>
+          <a:chOff x="0" y="0"/>
+          <a:chExt cx="0" cy="0"/>
+        </a:xfrm>
+      </p:grpSpPr>
+      <p:sp>
+        <p:nvSpPr>
+          <p:cNvPr id="2" name="Title 1">
+            <a:extLst>
+              <a:ext uri="{FF2B5EF4-FFF2-40B4-BE49-F238E27FC236}">
+                <a16:creationId xmlns:a16="http://schemas.microsoft.com/office/drawing/2014/main" id="{D0599F26-FA18-9293-FC2E-38C41BF805C0}"/>
+              </a:ext>
+            </a:extLst>
+          </p:cNvPr>
+          <p:cNvSpPr>
+            <a:spLocks noGrp="1"/>
+          </p:cNvSpPr>
+          <p:nvPr>
+            <p:ph type="title"/>
+          </p:nvPr>
+        </p:nvSpPr>
+        <p:spPr>
+          <a:xfrm>
+            <a:off x="113261" y="107589"/>
+            <a:ext cx="7886700" cy="590680"/>
+          </a:xfrm>
+        </p:spPr>
+        <p:txBody>
+          <a:bodyPr/>
+          <a:lstStyle/>
+          <a:p>
+            <a:r>
+              <a:rPr lang="en-CH" dirty="0"/>
+              <a:t>Optimisation </a:t>
+            </a:r>
+            <a:r>
+              <a:rPr lang="en-GB" dirty="0"/>
+              <a:t>in Machine Learning</a:t>
+            </a:r>
+            <a:endParaRPr lang="en-CH" dirty="0"/>
+          </a:p>
+        </p:txBody>
+      </p:sp>
+      <p:sp>
+        <p:nvSpPr>
+          <p:cNvPr id="3" name="Content Placeholder 2">
+            <a:extLst>
+              <a:ext uri="{FF2B5EF4-FFF2-40B4-BE49-F238E27FC236}">
+                <a16:creationId xmlns:a16="http://schemas.microsoft.com/office/drawing/2014/main" id="{7533B656-C348-405F-C9FA-423E2118AC8E}"/>
+              </a:ext>
+            </a:extLst>
+          </p:cNvPr>
+          <p:cNvSpPr>
+            <a:spLocks noGrp="1"/>
+          </p:cNvSpPr>
+          <p:nvPr>
+            <p:ph idx="1"/>
+          </p:nvPr>
+        </p:nvSpPr>
+        <p:spPr>
+          <a:xfrm>
+            <a:off x="628650" y="972590"/>
+            <a:ext cx="7886700" cy="3897066"/>
+          </a:xfrm>
+        </p:spPr>
+        <p:txBody>
+          <a:bodyPr>
+            <a:normAutofit/>
+          </a:bodyPr>
+          <a:lstStyle/>
+          <a:p>
+            <a:pPr marL="0" indent="0">
+              <a:buNone/>
+            </a:pPr>
+            <a:r>
+              <a:rPr lang="en-GB" sz="2400" dirty="0"/>
+              <a:t>Optimization is the process of adjusting a model's parameters to minimize the difference between the predicted output and the actual output (i.e., the error)*. This is typically done through iterative methods like gradient descent (more on that later). The goal is to improve the model's performance on a given task, such as classification or regression, by minimizing a loss function.</a:t>
+            </a:r>
+          </a:p>
+          <a:p>
+            <a:pPr marL="0" indent="0">
+              <a:buNone/>
+            </a:pPr>
+            <a:endParaRPr lang="en-GB" sz="2400" dirty="0"/>
+          </a:p>
+          <a:p>
+            <a:pPr marL="0" indent="0">
+              <a:buNone/>
+            </a:pPr>
+            <a:r>
+              <a:rPr lang="en-GB" sz="1600" dirty="0"/>
+              <a:t>* In supervised learning.</a:t>
+            </a:r>
+            <a:endParaRPr lang="en-CH" sz="1600" dirty="0"/>
+          </a:p>
+        </p:txBody>
+      </p:sp>
+    </p:spTree>
+    <p:extLst>
+      <p:ext uri="{BB962C8B-B14F-4D97-AF65-F5344CB8AC3E}">
+        <p14:creationId xmlns:p14="http://schemas.microsoft.com/office/powerpoint/2010/main" val="885943534"/>
+      </p:ext>
+    </p:extLst>
+  </p:cSld>
+  <p:clrMapOvr>
+    <a:masterClrMapping/>
+  </p:clrMapOvr>
+</p:sld>
+</file>
+
 <file path=ppt/slides/slide2.xml><?xml version="1.0" encoding="utf-8"?>
 <p:sld xmlns:a="http://schemas.openxmlformats.org/drawingml/2006/main" xmlns:r="http://schemas.openxmlformats.org/officeDocument/2006/relationships" xmlns:p="http://schemas.openxmlformats.org/presentationml/2006/main">
   <p:cSld>
@@ -4227,7 +4454,7 @@
           <p:cNvPr id="2" name="Title 1">
             <a:extLst>
               <a:ext uri="{FF2B5EF4-FFF2-40B4-BE49-F238E27FC236}">
-                <a16:creationId xmlns:a16="http://schemas.microsoft.com/office/drawing/2014/main" id="{AEED3EAF-35F7-26AA-78F7-FB8E3344F2EE}"/>
+                <a16:creationId xmlns:a16="http://schemas.microsoft.com/office/drawing/2014/main" id="{E6C71083-6EE7-939D-4BED-28BE40485CF7}"/>
               </a:ext>
             </a:extLst>
           </p:cNvPr>
@@ -4250,10 +4477,48 @@
           </a:p>
         </p:txBody>
       </p:sp>
+      <p:sp>
+        <p:nvSpPr>
+          <p:cNvPr id="3" name="Text Placeholder 2">
+            <a:extLst>
+              <a:ext uri="{FF2B5EF4-FFF2-40B4-BE49-F238E27FC236}">
+                <a16:creationId xmlns:a16="http://schemas.microsoft.com/office/drawing/2014/main" id="{2D77C8E1-6D4C-A05D-7842-67906065AE71}"/>
+              </a:ext>
+            </a:extLst>
+          </p:cNvPr>
+          <p:cNvSpPr>
+            <a:spLocks noGrp="1"/>
+          </p:cNvSpPr>
+          <p:nvPr>
+            <p:ph type="body" idx="1"/>
+          </p:nvPr>
+        </p:nvSpPr>
+        <p:spPr/>
+        <p:txBody>
+          <a:bodyPr/>
+          <a:lstStyle/>
+          <a:p>
+            <a:r>
+              <a:rPr lang="en-GB" dirty="0"/>
+              <a:t>“The limits of my language mean the limits of my world.” </a:t>
+            </a:r>
+          </a:p>
+          <a:p>
+            <a:pPr algn="r"/>
+            <a:r>
+              <a:rPr lang="en-GB" dirty="0"/>
+              <a:t>— Ludwig Wittgenstein.</a:t>
+            </a:r>
+          </a:p>
+          <a:p>
+            <a:endParaRPr lang="en-CH" dirty="0"/>
+          </a:p>
+        </p:txBody>
+      </p:sp>
     </p:spTree>
     <p:extLst>
       <p:ext uri="{BB962C8B-B14F-4D97-AF65-F5344CB8AC3E}">
-        <p14:creationId xmlns:p14="http://schemas.microsoft.com/office/powerpoint/2010/main" val="13623015"/>
+        <p14:creationId xmlns:p14="http://schemas.microsoft.com/office/powerpoint/2010/main" val="1754940250"/>
       </p:ext>
     </p:extLst>
   </p:cSld>
@@ -4294,8 +4559,8 @@
         </p:nvSpPr>
         <p:spPr>
           <a:xfrm>
-            <a:off x="690466" y="1383478"/>
-            <a:ext cx="7931020" cy="2031325"/>
+            <a:off x="606490" y="1140589"/>
+            <a:ext cx="7931020" cy="2862322"/>
           </a:xfrm>
           <a:prstGeom prst="rect">
             <a:avLst/>
@@ -4309,7 +4574,7 @@
           <a:lstStyle/>
           <a:p>
             <a:r>
-              <a:rPr lang="en-GB" b="1" dirty="0">
+              <a:rPr lang="en-GB" sz="2000" b="1" dirty="0">
                 <a:latin typeface="Arial" panose="020B0604020202020204" pitchFamily="34" charset="0"/>
                 <a:cs typeface="Arial" panose="020B0604020202020204" pitchFamily="34" charset="0"/>
               </a:rPr>
@@ -4317,19 +4582,25 @@
             </a:r>
           </a:p>
           <a:p>
-            <a:endParaRPr lang="en-GB" b="1" dirty="0">
+            <a:endParaRPr lang="en-GB" sz="2000" b="1" dirty="0">
               <a:latin typeface="Arial" panose="020B0604020202020204" pitchFamily="34" charset="0"/>
               <a:cs typeface="Arial" panose="020B0604020202020204" pitchFamily="34" charset="0"/>
             </a:endParaRPr>
           </a:p>
           <a:p>
             <a:r>
-              <a:rPr lang="en-GB" dirty="0">
+              <a:rPr lang="en-GB" sz="2000" dirty="0">
                 <a:latin typeface="Arial" panose="020B0604020202020204" pitchFamily="34" charset="0"/>
                 <a:cs typeface="Arial" panose="020B0604020202020204" pitchFamily="34" charset="0"/>
               </a:rPr>
               <a:t>“Training a model from features and their corresponding labels. Supervised machine learning is analogous to learning a subject by studying a set of questions and their corresponding answers. After mastering the mapping between questions and answers, a student can then provide answers to new (never-before-seen) questions on the same topic.”</a:t>
             </a:r>
+          </a:p>
+          <a:p>
+            <a:endParaRPr lang="en-GB" sz="2000" dirty="0">
+              <a:latin typeface="Arial" panose="020B0604020202020204" pitchFamily="34" charset="0"/>
+              <a:cs typeface="Arial" panose="020B0604020202020204" pitchFamily="34" charset="0"/>
+            </a:endParaRPr>
           </a:p>
         </p:txBody>
       </p:sp>
@@ -4412,8 +4683,8 @@
         </p:nvSpPr>
         <p:spPr>
           <a:xfrm>
-            <a:off x="606490" y="972931"/>
-            <a:ext cx="7931020" cy="3416320"/>
+            <a:off x="606490" y="525036"/>
+            <a:ext cx="7931020" cy="4093428"/>
           </a:xfrm>
           <a:prstGeom prst="rect">
             <a:avLst/>
@@ -4427,7 +4698,7 @@
           <a:lstStyle/>
           <a:p>
             <a:r>
-              <a:rPr lang="en-GB" b="1" dirty="0">
+              <a:rPr lang="en-GB" sz="2000" b="1" dirty="0">
                 <a:latin typeface="Arial" panose="020B0604020202020204" pitchFamily="34" charset="0"/>
                 <a:cs typeface="Arial" panose="020B0604020202020204" pitchFamily="34" charset="0"/>
               </a:rPr>
@@ -4435,28 +4706,28 @@
             </a:r>
           </a:p>
           <a:p>
-            <a:endParaRPr lang="en-GB" b="1" dirty="0">
+            <a:endParaRPr lang="en-GB" sz="2000" b="1" dirty="0">
               <a:latin typeface="Arial" panose="020B0604020202020204" pitchFamily="34" charset="0"/>
               <a:cs typeface="Arial" panose="020B0604020202020204" pitchFamily="34" charset="0"/>
             </a:endParaRPr>
           </a:p>
           <a:p>
             <a:r>
-              <a:rPr lang="en-GB" dirty="0">
+              <a:rPr lang="en-GB" sz="2000" dirty="0">
                 <a:latin typeface="Arial" panose="020B0604020202020204" pitchFamily="34" charset="0"/>
                 <a:cs typeface="Arial" panose="020B0604020202020204" pitchFamily="34" charset="0"/>
               </a:rPr>
               <a:t>“Training a model to find patterns in a dataset, typically an </a:t>
             </a:r>
             <a:r>
-              <a:rPr lang="en-GB" b="1" dirty="0" err="1">
+              <a:rPr lang="en-GB" sz="2000" b="1" dirty="0" err="1">
                 <a:latin typeface="Arial" panose="020B0604020202020204" pitchFamily="34" charset="0"/>
                 <a:cs typeface="Arial" panose="020B0604020202020204" pitchFamily="34" charset="0"/>
               </a:rPr>
               <a:t>unlabeled</a:t>
             </a:r>
             <a:r>
-              <a:rPr lang="en-GB" dirty="0">
+              <a:rPr lang="en-GB" sz="2000" dirty="0">
                 <a:latin typeface="Arial" panose="020B0604020202020204" pitchFamily="34" charset="0"/>
                 <a:cs typeface="Arial" panose="020B0604020202020204" pitchFamily="34" charset="0"/>
               </a:rPr>
@@ -4465,21 +4736,21 @@
           </a:p>
           <a:p>
             <a:r>
-              <a:rPr lang="en-GB" dirty="0">
+              <a:rPr lang="en-GB" sz="2000" dirty="0">
                 <a:latin typeface="Arial" panose="020B0604020202020204" pitchFamily="34" charset="0"/>
                 <a:cs typeface="Arial" panose="020B0604020202020204" pitchFamily="34" charset="0"/>
               </a:rPr>
               <a:t>The most common use of unsupervised machine learning is to cluster data into groups of similar examples. For example, an unsupervised machine learning algorithm can </a:t>
             </a:r>
             <a:r>
-              <a:rPr lang="en-GB" b="1" dirty="0">
+              <a:rPr lang="en-GB" sz="2000" b="1" dirty="0">
                 <a:latin typeface="Arial" panose="020B0604020202020204" pitchFamily="34" charset="0"/>
                 <a:cs typeface="Arial" panose="020B0604020202020204" pitchFamily="34" charset="0"/>
               </a:rPr>
               <a:t>cluster</a:t>
             </a:r>
             <a:r>
-              <a:rPr lang="en-GB" dirty="0">
+              <a:rPr lang="en-GB" sz="2000" dirty="0">
                 <a:latin typeface="Arial" panose="020B0604020202020204" pitchFamily="34" charset="0"/>
                 <a:cs typeface="Arial" panose="020B0604020202020204" pitchFamily="34" charset="0"/>
               </a:rPr>
@@ -4580,8 +4851,8 @@
         </p:nvSpPr>
         <p:spPr>
           <a:xfrm>
-            <a:off x="606490" y="972931"/>
-            <a:ext cx="7931020" cy="2308324"/>
+            <a:off x="606490" y="1140589"/>
+            <a:ext cx="7931020" cy="2862322"/>
           </a:xfrm>
           <a:prstGeom prst="rect">
             <a:avLst/>
@@ -4595,7 +4866,7 @@
           <a:lstStyle/>
           <a:p>
             <a:r>
-              <a:rPr lang="en-GB" b="1" dirty="0">
+              <a:rPr lang="en-GB" sz="2000" b="1" dirty="0">
                 <a:latin typeface="Arial" panose="020B0604020202020204" pitchFamily="34" charset="0"/>
                 <a:cs typeface="Arial" panose="020B0604020202020204" pitchFamily="34" charset="0"/>
               </a:rPr>
@@ -4603,21 +4874,21 @@
             </a:r>
           </a:p>
           <a:p>
-            <a:endParaRPr lang="en-GB" b="1" dirty="0">
+            <a:endParaRPr lang="en-GB" sz="2000" b="1" dirty="0">
               <a:latin typeface="Arial" panose="020B0604020202020204" pitchFamily="34" charset="0"/>
               <a:cs typeface="Arial" panose="020B0604020202020204" pitchFamily="34" charset="0"/>
             </a:endParaRPr>
           </a:p>
           <a:p>
             <a:r>
-              <a:rPr lang="en-GB" dirty="0">
+              <a:rPr lang="en-GB" sz="2000" dirty="0">
                 <a:latin typeface="Arial" panose="020B0604020202020204" pitchFamily="34" charset="0"/>
                 <a:cs typeface="Arial" panose="020B0604020202020204" pitchFamily="34" charset="0"/>
               </a:rPr>
               <a:t>“</a:t>
             </a:r>
             <a:r>
-              <a:rPr lang="en-GB" dirty="0">
+              <a:rPr lang="en-GB" sz="2000" dirty="0">
                 <a:solidFill>
                   <a:srgbClr val="202122"/>
                 </a:solidFill>
@@ -4626,7 +4897,7 @@
               <a:t>Semi-supervised learning falls between unsupervised learning (without any </a:t>
             </a:r>
             <a:r>
-              <a:rPr lang="en-GB" dirty="0" err="1">
+              <a:rPr lang="en-GB" sz="2000" dirty="0" err="1">
                 <a:solidFill>
                   <a:srgbClr val="202122"/>
                 </a:solidFill>
@@ -4635,7 +4906,7 @@
               <a:t>labeled</a:t>
             </a:r>
             <a:r>
-              <a:rPr lang="en-GB" dirty="0">
+              <a:rPr lang="en-GB" sz="2000" dirty="0">
                 <a:solidFill>
                   <a:srgbClr val="202122"/>
                 </a:solidFill>
@@ -4644,7 +4915,7 @@
               <a:t> training data) and supervised learning (with completely </a:t>
             </a:r>
             <a:r>
-              <a:rPr lang="en-GB" dirty="0" err="1">
+              <a:rPr lang="en-GB" sz="2000" dirty="0" err="1">
                 <a:solidFill>
                   <a:srgbClr val="202122"/>
                 </a:solidFill>
@@ -4653,7 +4924,7 @@
               <a:t>labeled</a:t>
             </a:r>
             <a:r>
-              <a:rPr lang="en-GB" dirty="0">
+              <a:rPr lang="en-GB" sz="2000" dirty="0">
                 <a:solidFill>
                   <a:srgbClr val="202122"/>
                 </a:solidFill>
@@ -4662,7 +4933,7 @@
               <a:t> training data). Some of the training examples are missing </a:t>
             </a:r>
             <a:r>
-              <a:rPr lang="en-GB" b="0" i="0" dirty="0">
+              <a:rPr lang="en-GB" sz="2000" b="0" i="0" dirty="0">
                 <a:solidFill>
                   <a:srgbClr val="202122"/>
                 </a:solidFill>
@@ -4672,7 +4943,7 @@
               <a:t>training labels, yet many machine-learning researchers have found that </a:t>
             </a:r>
             <a:r>
-              <a:rPr lang="en-GB" b="0" i="0" dirty="0" err="1">
+              <a:rPr lang="en-GB" sz="2000" b="0" i="0" dirty="0" err="1">
                 <a:solidFill>
                   <a:srgbClr val="202122"/>
                 </a:solidFill>
@@ -4682,7 +4953,7 @@
               <a:t>unlabeled</a:t>
             </a:r>
             <a:r>
-              <a:rPr lang="en-GB" b="0" i="0" dirty="0">
+              <a:rPr lang="en-GB" sz="2000" b="0" i="0" dirty="0">
                 <a:solidFill>
                   <a:srgbClr val="202122"/>
                 </a:solidFill>
@@ -4692,7 +4963,7 @@
               <a:t> data, when used in conjunction with a small amount of </a:t>
             </a:r>
             <a:r>
-              <a:rPr lang="en-GB" b="0" i="0" dirty="0" err="1">
+              <a:rPr lang="en-GB" sz="2000" b="0" i="0" dirty="0" err="1">
                 <a:solidFill>
                   <a:srgbClr val="202122"/>
                 </a:solidFill>
@@ -4702,7 +4973,7 @@
               <a:t>labeled</a:t>
             </a:r>
             <a:r>
-              <a:rPr lang="en-GB" b="0" i="0" dirty="0">
+              <a:rPr lang="en-GB" sz="2000" b="0" i="0" dirty="0">
                 <a:solidFill>
                   <a:srgbClr val="202122"/>
                 </a:solidFill>
@@ -4711,7 +4982,7 @@
               </a:rPr>
               <a:t> data, can produce a considerable improvement in learning accuracy.”</a:t>
             </a:r>
-            <a:endParaRPr lang="en-GB" dirty="0">
+            <a:endParaRPr lang="en-GB" sz="2000" dirty="0">
               <a:latin typeface="Arial" panose="020B0604020202020204" pitchFamily="34" charset="0"/>
               <a:cs typeface="Arial" panose="020B0604020202020204" pitchFamily="34" charset="0"/>
             </a:endParaRPr>

</xml_diff>